<commit_message>
update policy structure graphic
Signed-off-by: Chip Zoller <chipzoller@gmail.com>
</commit_message>
<xml_diff>
--- a/static/images/kyverno_website_graphics.pptx
+++ b/static/images/kyverno_website_graphics.pptx
@@ -289,7 +289,7 @@
       </p15:sldGuideLst>
     </p:ext>
     <p:ext uri="http://customooxmlschemas.google.com/">
-      <go:slidesCustomData xmlns="" xmlns:mc="http://schemas.openxmlformats.org/markup-compatibility/2006" xmlns:mv="urn:schemas-microsoft-com:mac:vml" xmlns:c="http://schemas.openxmlformats.org/drawingml/2006/chart" xmlns:dgm="http://schemas.openxmlformats.org/drawingml/2006/diagram" xmlns:o="urn:schemas-microsoft-com:office:office" xmlns:v="urn:schemas-microsoft-com:vml" xmlns:pvml="urn:schemas-microsoft-com:office:powerpoint" xmlns:com="http://schemas.openxmlformats.org/drawingml/2006/compatibility" xmlns:p14="http://schemas.microsoft.com/office/powerpoint/2010/main" xmlns:p15="http://schemas.microsoft.com/office/powerpoint/2012/main" xmlns:ahyp="http://schemas.microsoft.com/office/drawing/2018/hyperlinkcolor" xmlns:go="http://customooxmlschemas.google.com/" r:id="rId13" roundtripDataSignature="AMtx7mi6Z4N5JfcDkIPXdx1+XT6Ohc5gxQ=="/>
+      <go:slidesCustomData xmlns:go="http://customooxmlschemas.google.com/" xmlns:ahyp="http://schemas.microsoft.com/office/drawing/2018/hyperlinkcolor" xmlns:p15="http://schemas.microsoft.com/office/powerpoint/2012/main" xmlns:p14="http://schemas.microsoft.com/office/powerpoint/2010/main" xmlns:com="http://schemas.openxmlformats.org/drawingml/2006/compatibility" xmlns:pvml="urn:schemas-microsoft-com:office:powerpoint" xmlns:v="urn:schemas-microsoft-com:vml" xmlns:o="urn:schemas-microsoft-com:office:office" xmlns:dgm="http://schemas.openxmlformats.org/drawingml/2006/diagram" xmlns:c="http://schemas.openxmlformats.org/drawingml/2006/chart" xmlns:mv="urn:schemas-microsoft-com:mac:vml" xmlns:mc="http://schemas.openxmlformats.org/markup-compatibility/2006" xmlns="" r:id="rId13" roundtripDataSignature="AMtx7mi6Z4N5JfcDkIPXdx1+XT6Ohc5gxQ=="/>
     </p:ext>
   </p:extLst>
 </p:presentation>
@@ -22949,8 +22949,8 @@
         </p:nvSpPr>
         <p:spPr>
           <a:xfrm>
-            <a:off x="8404102" y="555692"/>
-            <a:ext cx="2832827" cy="3477875"/>
+            <a:off x="8404102" y="236094"/>
+            <a:ext cx="2832827" cy="3816429"/>
           </a:xfrm>
           <a:prstGeom prst="rect">
             <a:avLst/>
@@ -23000,6 +23000,16 @@
             <a:r>
               <a:rPr lang="en-US" sz="2200"/>
               <a:t>Annotations</a:t>
+            </a:r>
+          </a:p>
+          <a:p>
+            <a:pPr marL="228600" indent="-228600">
+              <a:buFont typeface="Arial" panose="020B0604020202020204" pitchFamily="34" charset="0"/>
+              <a:buChar char="•"/>
+            </a:pPr>
+            <a:r>
+              <a:rPr lang="en-US" sz="2200"/>
+              <a:t>Operations</a:t>
             </a:r>
             <a:endParaRPr lang="en-US" sz="2200" dirty="0"/>
           </a:p>

</xml_diff>

<commit_message>
update architecture diagram (#978)
Signed-off-by: Jim Bugwadia <jim@nirmata.com>
Co-authored-by: Chip Zoller <chipzoller@gmail.com>
</commit_message>
<xml_diff>
--- a/static/images/kyverno_website_graphics.pptx
+++ b/static/images/kyverno_website_graphics.pptx
@@ -14766,8 +14766,8 @@
         </p:nvSpPr>
         <p:spPr>
           <a:xfrm>
-            <a:off x="3162300" y="1873166"/>
-            <a:ext cx="6711950" cy="2751600"/>
+            <a:off x="3027705" y="1873166"/>
+            <a:ext cx="6846545" cy="2751600"/>
           </a:xfrm>
           <a:prstGeom prst="rect">
             <a:avLst/>
@@ -15586,7 +15586,7 @@
               <a:buNone/>
             </a:pPr>
             <a:r>
-              <a:rPr lang="en-US" sz="2400" b="1" i="0" u="none" strike="noStrike" cap="none">
+              <a:rPr lang="en-US" sz="2400" b="1" i="0" u="none" strike="noStrike" cap="none" dirty="0">
                 <a:solidFill>
                   <a:schemeClr val="lt1"/>
                 </a:solidFill>
@@ -15595,7 +15595,7 @@
                 <a:cs typeface="Arial"/>
                 <a:sym typeface="Arial"/>
               </a:rPr>
-              <a:t>Webhook Server</a:t>
+              <a:t>Admission Controller</a:t>
             </a:r>
             <a:endParaRPr sz="1400" b="1" i="0" u="none" strike="noStrike" cap="none" dirty="0">
               <a:solidFill>
@@ -15673,8 +15673,8 @@
         </p:nvSpPr>
         <p:spPr>
           <a:xfrm>
-            <a:off x="3298078" y="1673066"/>
-            <a:ext cx="1268400" cy="400200"/>
+            <a:off x="3205240" y="4495671"/>
+            <a:ext cx="1731369" cy="215444"/>
           </a:xfrm>
           <a:prstGeom prst="rect">
             <a:avLst/>
@@ -15687,12 +15687,12 @@
           </a:ln>
         </p:spPr>
         <p:txBody>
-          <a:bodyPr spcFirstLastPara="1" wrap="square" lIns="91425" tIns="45700" rIns="91425" bIns="45700" anchor="t" anchorCtr="0">
+          <a:bodyPr spcFirstLastPara="1" wrap="square" lIns="0" tIns="0" rIns="0" bIns="0" anchor="t" anchorCtr="0">
             <a:spAutoFit/>
           </a:bodyPr>
           <a:lstStyle/>
           <a:p>
-            <a:pPr marL="0" marR="0" lvl="0" indent="0" algn="l" rtl="0">
+            <a:pPr marL="0" marR="0" lvl="0" indent="0" algn="ctr" rtl="0">
               <a:lnSpc>
                 <a:spcPct val="100000"/>
               </a:lnSpc>
@@ -15710,7 +15710,7 @@
               <a:buNone/>
             </a:pPr>
             <a:r>
-              <a:rPr lang="en-US" sz="2000" b="1" i="0" u="none" strike="noStrike" cap="none" dirty="0">
+              <a:rPr lang="en-US" b="1" i="0" u="none" strike="noStrike" cap="none" dirty="0">
                 <a:solidFill>
                   <a:schemeClr val="accent1"/>
                 </a:solidFill>
@@ -15719,9 +15719,9 @@
                 <a:cs typeface="Arial"/>
                 <a:sym typeface="Arial"/>
               </a:rPr>
-              <a:t>Kyverno</a:t>
+              <a:t>Kyverno Controllers</a:t>
             </a:r>
-            <a:endParaRPr sz="1800" b="1" i="0" u="none" strike="noStrike" cap="none" dirty="0">
+            <a:endParaRPr sz="1200" b="1" i="0" u="none" strike="noStrike" cap="none" dirty="0">
               <a:solidFill>
                 <a:schemeClr val="accent1"/>
               </a:solidFill>
@@ -17926,11 +17926,13 @@
             <a:off x="5616139" y="3173230"/>
             <a:ext cx="1853788" cy="652174"/>
           </a:xfrm>
-          <a:prstGeom prst="rect">
+          <a:prstGeom prst="roundRect">
             <a:avLst/>
           </a:prstGeom>
           <a:solidFill>
-            <a:schemeClr val="accent1"/>
+            <a:schemeClr val="bg1">
+              <a:lumMod val="50000"/>
+            </a:schemeClr>
           </a:solidFill>
           <a:ln w="12700" cap="flat" cmpd="sng">
             <a:noFill/>
@@ -18176,7 +18178,7 @@
               <a:buNone/>
             </a:pPr>
             <a:r>
-              <a:rPr lang="en-US" sz="1600" b="1" i="1" dirty="0" err="1">
+              <a:rPr lang="en-US" sz="1600" b="1" i="1" dirty="0">
                 <a:solidFill>
                   <a:schemeClr val="dk1"/>
                 </a:solidFill>
@@ -18245,7 +18247,6 @@
           <p:cNvCxnSpPr>
             <a:cxnSpLocks/>
             <a:stCxn id="48" idx="1"/>
-            <a:endCxn id="163" idx="2"/>
           </p:cNvCxnSpPr>
           <p:nvPr/>
         </p:nvCxnSpPr>

</xml_diff>

<commit_message>
add cleanup controller (#1317)
Signed-off-by: ShutingZhao <shuting@nirmata.com>
</commit_message>
<xml_diff>
--- a/static/images/kyverno_website_graphics.pptx
+++ b/static/images/kyverno_website_graphics.pptx
@@ -275,7 +275,7 @@
       </p15:sldGuideLst>
     </p:ext>
     <p:ext uri="GoogleSlidesCustomDataVersion2">
-      <go:slidesCustomData xmlns:go="http://customooxmlschemas.google.com/" r:id="rId20" roundtripDataSignature="AMtx7mhKmdbaoWNqgBvvmxv5G1CBjYhyGg=="/>
+      <go:slidesCustomData xmlns:go="http://customooxmlschemas.google.com/" r:id="rId20" roundtripDataSignature="AMtx7mjFB5kWHPu5vRlaui1o4hKQSJUW2g=="/>
     </p:ext>
   </p:extLst>
 </p:presentation>
@@ -15844,83 +15844,9 @@
           </a:p>
         </p:txBody>
       </p:sp>
-      <p:sp>
-        <p:nvSpPr>
-          <p:cNvPr id="99" name="Google Shape;99;gdea865f612_0_48"/>
-          <p:cNvSpPr/>
-          <p:nvPr/>
-        </p:nvSpPr>
-        <p:spPr>
-          <a:xfrm>
-            <a:off x="3790592" y="2612283"/>
-            <a:ext cx="3676200" cy="470100"/>
-          </a:xfrm>
-          <a:prstGeom prst="rect">
-            <a:avLst/>
-          </a:prstGeom>
-          <a:solidFill>
-            <a:schemeClr val="accent1"/>
-          </a:solidFill>
-          <a:ln cap="flat" cmpd="sng" w="12700">
-            <a:solidFill>
-              <a:srgbClr val="31538F"/>
-            </a:solidFill>
-            <a:prstDash val="solid"/>
-            <a:miter lim="800000"/>
-            <a:headEnd len="sm" w="sm" type="none"/>
-            <a:tailEnd len="sm" w="sm" type="none"/>
-          </a:ln>
-        </p:spPr>
-        <p:txBody>
-          <a:bodyPr anchorCtr="0" anchor="ctr" bIns="45700" lIns="91425" spcFirstLastPara="1" rIns="91425" wrap="square" tIns="45700">
-            <a:noAutofit/>
-          </a:bodyPr>
-          <a:lstStyle/>
-          <a:p>
-            <a:pPr indent="0" lvl="0" marL="0" marR="0" rtl="0" algn="ctr">
-              <a:lnSpc>
-                <a:spcPct val="100000"/>
-              </a:lnSpc>
-              <a:spcBef>
-                <a:spcPts val="0"/>
-              </a:spcBef>
-              <a:spcAft>
-                <a:spcPts val="0"/>
-              </a:spcAft>
-              <a:buClr>
-                <a:srgbClr val="000000"/>
-              </a:buClr>
-              <a:buSzPts val="2400"/>
-              <a:buFont typeface="Arial"/>
-              <a:buNone/>
-            </a:pPr>
-            <a:r>
-              <a:rPr b="1" i="0" lang="en-US" sz="2400" u="none" cap="none" strike="noStrike">
-                <a:solidFill>
-                  <a:schemeClr val="lt1"/>
-                </a:solidFill>
-                <a:latin typeface="Arial"/>
-                <a:ea typeface="Arial"/>
-                <a:cs typeface="Arial"/>
-                <a:sym typeface="Arial"/>
-              </a:rPr>
-              <a:t>Admission Controller</a:t>
-            </a:r>
-            <a:endParaRPr b="1" i="0" sz="1400" u="none" cap="none" strike="noStrike">
-              <a:solidFill>
-                <a:schemeClr val="lt1"/>
-              </a:solidFill>
-              <a:latin typeface="Arial"/>
-              <a:ea typeface="Arial"/>
-              <a:cs typeface="Arial"/>
-              <a:sym typeface="Arial"/>
-            </a:endParaRPr>
-          </a:p>
-        </p:txBody>
-      </p:sp>
       <p:cxnSp>
         <p:nvCxnSpPr>
-          <p:cNvPr id="100" name="Google Shape;100;gdea865f612_0_48"/>
+          <p:cNvPr id="99" name="Google Shape;99;gdea865f612_0_48"/>
           <p:cNvCxnSpPr/>
           <p:nvPr/>
         </p:nvCxnSpPr>
@@ -15946,7 +15872,7 @@
       </p:cxnSp>
       <p:cxnSp>
         <p:nvCxnSpPr>
-          <p:cNvPr id="101" name="Google Shape;101;gdea865f612_0_48"/>
+          <p:cNvPr id="100" name="Google Shape;100;gdea865f612_0_48"/>
           <p:cNvCxnSpPr/>
           <p:nvPr/>
         </p:nvCxnSpPr>
@@ -15974,7 +15900,7 @@
       </p:cxnSp>
       <p:sp>
         <p:nvSpPr>
-          <p:cNvPr id="102" name="Google Shape;102;gdea865f612_0_48"/>
+          <p:cNvPr id="101" name="Google Shape;101;gdea865f612_0_48"/>
           <p:cNvSpPr txBox="1"/>
           <p:nvPr/>
         </p:nvSpPr>
@@ -16042,7 +15968,7 @@
       </p:sp>
       <p:sp>
         <p:nvSpPr>
-          <p:cNvPr id="103" name="Google Shape;103;gdea865f612_0_48"/>
+          <p:cNvPr id="102" name="Google Shape;102;gdea865f612_0_48"/>
           <p:cNvSpPr/>
           <p:nvPr/>
         </p:nvSpPr>
@@ -16142,7 +16068,7 @@
       </p:sp>
       <p:sp>
         <p:nvSpPr>
-          <p:cNvPr id="104" name="Google Shape;104;gdea865f612_0_48"/>
+          <p:cNvPr id="103" name="Google Shape;103;gdea865f612_0_48"/>
           <p:cNvSpPr/>
           <p:nvPr/>
         </p:nvSpPr>
@@ -16220,7 +16146,7 @@
       </p:sp>
       <p:sp>
         <p:nvSpPr>
-          <p:cNvPr id="105" name="Google Shape;105;gdea865f612_0_48"/>
+          <p:cNvPr id="104" name="Google Shape;104;gdea865f612_0_48"/>
           <p:cNvSpPr/>
           <p:nvPr/>
         </p:nvSpPr>
@@ -16307,7 +16233,7 @@
       </p:sp>
       <p:sp>
         <p:nvSpPr>
-          <p:cNvPr id="106" name="Google Shape;106;gdea865f612_0_48"/>
+          <p:cNvPr id="105" name="Google Shape;105;gdea865f612_0_48"/>
           <p:cNvSpPr/>
           <p:nvPr/>
         </p:nvSpPr>
@@ -16385,7 +16311,7 @@
       </p:sp>
       <p:sp>
         <p:nvSpPr>
-          <p:cNvPr id="107" name="Google Shape;107;gdea865f612_0_48"/>
+          <p:cNvPr id="106" name="Google Shape;106;gdea865f612_0_48"/>
           <p:cNvSpPr/>
           <p:nvPr/>
         </p:nvSpPr>
@@ -16504,7 +16430,7 @@
       </p:sp>
       <p:cxnSp>
         <p:nvCxnSpPr>
-          <p:cNvPr id="108" name="Google Shape;108;gdea865f612_0_48"/>
+          <p:cNvPr id="107" name="Google Shape;107;gdea865f612_0_48"/>
           <p:cNvCxnSpPr/>
           <p:nvPr/>
         </p:nvCxnSpPr>
@@ -16532,7 +16458,7 @@
       </p:cxnSp>
       <p:sp>
         <p:nvSpPr>
-          <p:cNvPr id="109" name="Google Shape;109;gdea865f612_0_48"/>
+          <p:cNvPr id="108" name="Google Shape;108;gdea865f612_0_48"/>
           <p:cNvSpPr/>
           <p:nvPr/>
         </p:nvSpPr>
@@ -16617,6 +16543,106 @@
                 <a:sym typeface="Arial"/>
               </a:rPr>
               <a:t>Controllers</a:t>
+            </a:r>
+            <a:endParaRPr b="0" i="0" sz="1600" u="none" cap="none" strike="noStrike">
+              <a:solidFill>
+                <a:srgbClr val="000000"/>
+              </a:solidFill>
+              <a:latin typeface="Arial"/>
+              <a:ea typeface="Arial"/>
+              <a:cs typeface="Arial"/>
+              <a:sym typeface="Arial"/>
+            </a:endParaRPr>
+          </a:p>
+        </p:txBody>
+      </p:sp>
+      <p:sp>
+        <p:nvSpPr>
+          <p:cNvPr id="109" name="Google Shape;109;gdea865f612_0_48"/>
+          <p:cNvSpPr/>
+          <p:nvPr/>
+        </p:nvSpPr>
+        <p:spPr>
+          <a:xfrm>
+            <a:off x="7746889" y="4206657"/>
+            <a:ext cx="1628400" cy="594600"/>
+          </a:xfrm>
+          <a:prstGeom prst="rect">
+            <a:avLst/>
+          </a:prstGeom>
+          <a:solidFill>
+            <a:schemeClr val="accent1"/>
+          </a:solidFill>
+          <a:ln>
+            <a:noFill/>
+          </a:ln>
+        </p:spPr>
+        <p:txBody>
+          <a:bodyPr anchorCtr="0" anchor="ctr" bIns="45700" lIns="91425" spcFirstLastPara="1" rIns="91425" wrap="square" tIns="45700">
+            <a:noAutofit/>
+          </a:bodyPr>
+          <a:lstStyle/>
+          <a:p>
+            <a:pPr indent="0" lvl="0" marL="0" marR="0" rtl="0" algn="ctr">
+              <a:lnSpc>
+                <a:spcPct val="100000"/>
+              </a:lnSpc>
+              <a:spcBef>
+                <a:spcPts val="0"/>
+              </a:spcBef>
+              <a:spcAft>
+                <a:spcPts val="0"/>
+              </a:spcAft>
+              <a:buClr>
+                <a:srgbClr val="000000"/>
+              </a:buClr>
+              <a:buSzPts val="1800"/>
+              <a:buFont typeface="Arial"/>
+              <a:buNone/>
+            </a:pPr>
+            <a:r>
+              <a:rPr b="0" i="0" lang="en-US" sz="1800" u="none" cap="none" strike="noStrike">
+                <a:solidFill>
+                  <a:schemeClr val="lt1"/>
+                </a:solidFill>
+                <a:latin typeface="Arial"/>
+                <a:ea typeface="Arial"/>
+                <a:cs typeface="Arial"/>
+                <a:sym typeface="Arial"/>
+              </a:rPr>
+              <a:t>Background</a:t>
+            </a:r>
+            <a:endParaRPr/>
+          </a:p>
+          <a:p>
+            <a:pPr indent="0" lvl="0" marL="0" marR="0" rtl="0" algn="ctr">
+              <a:lnSpc>
+                <a:spcPct val="100000"/>
+              </a:lnSpc>
+              <a:spcBef>
+                <a:spcPts val="0"/>
+              </a:spcBef>
+              <a:spcAft>
+                <a:spcPts val="0"/>
+              </a:spcAft>
+              <a:buClr>
+                <a:srgbClr val="000000"/>
+              </a:buClr>
+              <a:buSzPts val="1800"/>
+              <a:buFont typeface="Arial"/>
+              <a:buNone/>
+            </a:pPr>
+            <a:r>
+              <a:rPr b="0" i="0" lang="en-US" sz="1800" u="none" cap="none" strike="noStrike">
+                <a:solidFill>
+                  <a:schemeClr val="lt1"/>
+                </a:solidFill>
+                <a:latin typeface="Arial"/>
+                <a:ea typeface="Arial"/>
+                <a:cs typeface="Arial"/>
+                <a:sym typeface="Arial"/>
+              </a:rPr>
+              <a:t>Controller</a:t>
             </a:r>
             <a:endParaRPr b="0" i="0" sz="1600" u="none" cap="none" strike="noStrike">
               <a:solidFill>
@@ -16633,106 +16659,6 @@
       <p:sp>
         <p:nvSpPr>
           <p:cNvPr id="110" name="Google Shape;110;gdea865f612_0_48"/>
-          <p:cNvSpPr/>
-          <p:nvPr/>
-        </p:nvSpPr>
-        <p:spPr>
-          <a:xfrm>
-            <a:off x="7746889" y="4206657"/>
-            <a:ext cx="1628400" cy="594600"/>
-          </a:xfrm>
-          <a:prstGeom prst="rect">
-            <a:avLst/>
-          </a:prstGeom>
-          <a:solidFill>
-            <a:schemeClr val="accent1"/>
-          </a:solidFill>
-          <a:ln>
-            <a:noFill/>
-          </a:ln>
-        </p:spPr>
-        <p:txBody>
-          <a:bodyPr anchorCtr="0" anchor="ctr" bIns="45700" lIns="91425" spcFirstLastPara="1" rIns="91425" wrap="square" tIns="45700">
-            <a:noAutofit/>
-          </a:bodyPr>
-          <a:lstStyle/>
-          <a:p>
-            <a:pPr indent="0" lvl="0" marL="0" marR="0" rtl="0" algn="ctr">
-              <a:lnSpc>
-                <a:spcPct val="100000"/>
-              </a:lnSpc>
-              <a:spcBef>
-                <a:spcPts val="0"/>
-              </a:spcBef>
-              <a:spcAft>
-                <a:spcPts val="0"/>
-              </a:spcAft>
-              <a:buClr>
-                <a:srgbClr val="000000"/>
-              </a:buClr>
-              <a:buSzPts val="1800"/>
-              <a:buFont typeface="Arial"/>
-              <a:buNone/>
-            </a:pPr>
-            <a:r>
-              <a:rPr b="0" i="0" lang="en-US" sz="1800" u="none" cap="none" strike="noStrike">
-                <a:solidFill>
-                  <a:schemeClr val="lt1"/>
-                </a:solidFill>
-                <a:latin typeface="Arial"/>
-                <a:ea typeface="Arial"/>
-                <a:cs typeface="Arial"/>
-                <a:sym typeface="Arial"/>
-              </a:rPr>
-              <a:t>Background</a:t>
-            </a:r>
-            <a:endParaRPr/>
-          </a:p>
-          <a:p>
-            <a:pPr indent="0" lvl="0" marL="0" marR="0" rtl="0" algn="ctr">
-              <a:lnSpc>
-                <a:spcPct val="100000"/>
-              </a:lnSpc>
-              <a:spcBef>
-                <a:spcPts val="0"/>
-              </a:spcBef>
-              <a:spcAft>
-                <a:spcPts val="0"/>
-              </a:spcAft>
-              <a:buClr>
-                <a:srgbClr val="000000"/>
-              </a:buClr>
-              <a:buSzPts val="1800"/>
-              <a:buFont typeface="Arial"/>
-              <a:buNone/>
-            </a:pPr>
-            <a:r>
-              <a:rPr b="0" i="0" lang="en-US" sz="1800" u="none" cap="none" strike="noStrike">
-                <a:solidFill>
-                  <a:schemeClr val="lt1"/>
-                </a:solidFill>
-                <a:latin typeface="Arial"/>
-                <a:ea typeface="Arial"/>
-                <a:cs typeface="Arial"/>
-                <a:sym typeface="Arial"/>
-              </a:rPr>
-              <a:t>Controller</a:t>
-            </a:r>
-            <a:endParaRPr b="0" i="0" sz="1600" u="none" cap="none" strike="noStrike">
-              <a:solidFill>
-                <a:srgbClr val="000000"/>
-              </a:solidFill>
-              <a:latin typeface="Arial"/>
-              <a:ea typeface="Arial"/>
-              <a:cs typeface="Arial"/>
-              <a:sym typeface="Arial"/>
-            </a:endParaRPr>
-          </a:p>
-        </p:txBody>
-      </p:sp>
-      <p:sp>
-        <p:nvSpPr>
-          <p:cNvPr id="111" name="Google Shape;111;gdea865f612_0_48"/>
           <p:cNvSpPr/>
           <p:nvPr/>
         </p:nvSpPr>
@@ -16810,7 +16736,7 @@
       </p:sp>
       <p:sp>
         <p:nvSpPr>
-          <p:cNvPr id="112" name="Google Shape;112;gdea865f612_0_48"/>
+          <p:cNvPr id="111" name="Google Shape;111;gdea865f612_0_48"/>
           <p:cNvSpPr/>
           <p:nvPr/>
         </p:nvSpPr>
@@ -16889,7 +16815,7 @@
       </p:sp>
       <p:sp>
         <p:nvSpPr>
-          <p:cNvPr id="113" name="Google Shape;113;gdea865f612_0_48"/>
+          <p:cNvPr id="112" name="Google Shape;112;gdea865f612_0_48"/>
           <p:cNvSpPr/>
           <p:nvPr/>
         </p:nvSpPr>
@@ -16967,7 +16893,7 @@
       </p:sp>
       <p:sp>
         <p:nvSpPr>
-          <p:cNvPr id="114" name="Google Shape;114;gdea865f612_0_48"/>
+          <p:cNvPr id="113" name="Google Shape;113;gdea865f612_0_48"/>
           <p:cNvSpPr/>
           <p:nvPr/>
         </p:nvSpPr>
@@ -17082,7 +17008,7 @@
       </p:sp>
       <p:cxnSp>
         <p:nvCxnSpPr>
-          <p:cNvPr id="115" name="Google Shape;115;gdea865f612_0_48"/>
+          <p:cNvPr id="114" name="Google Shape;114;gdea865f612_0_48"/>
           <p:cNvCxnSpPr/>
           <p:nvPr/>
         </p:nvCxnSpPr>
@@ -17110,7 +17036,7 @@
       </p:cxnSp>
       <p:sp>
         <p:nvSpPr>
-          <p:cNvPr id="116" name="Google Shape;116;gdea865f612_0_48"/>
+          <p:cNvPr id="115" name="Google Shape;115;gdea865f612_0_48"/>
           <p:cNvSpPr/>
           <p:nvPr/>
         </p:nvSpPr>
@@ -17188,7 +17114,7 @@
       </p:sp>
       <p:sp>
         <p:nvSpPr>
-          <p:cNvPr id="117" name="Google Shape;117;gdea865f612_0_48"/>
+          <p:cNvPr id="116" name="Google Shape;116;gdea865f612_0_48"/>
           <p:cNvSpPr/>
           <p:nvPr/>
         </p:nvSpPr>
@@ -17307,7 +17233,7 @@
       </p:sp>
       <p:cxnSp>
         <p:nvCxnSpPr>
-          <p:cNvPr id="118" name="Google Shape;118;gdea865f612_0_48"/>
+          <p:cNvPr id="117" name="Google Shape;117;gdea865f612_0_48"/>
           <p:cNvCxnSpPr/>
           <p:nvPr/>
         </p:nvCxnSpPr>
@@ -17333,10 +17259,10 @@
       </p:cxnSp>
       <p:cxnSp>
         <p:nvCxnSpPr>
-          <p:cNvPr id="119" name="Google Shape;119;gdea865f612_0_48"/>
+          <p:cNvPr id="118" name="Google Shape;118;gdea865f612_0_48"/>
           <p:cNvCxnSpPr>
-            <a:stCxn id="110" idx="2"/>
-            <a:endCxn id="112" idx="3"/>
+            <a:stCxn id="109" idx="2"/>
+            <a:endCxn id="111" idx="3"/>
           </p:cNvCxnSpPr>
           <p:nvPr/>
         </p:nvCxnSpPr>
@@ -17362,10 +17288,10 @@
       </p:cxnSp>
       <p:cxnSp>
         <p:nvCxnSpPr>
-          <p:cNvPr id="120" name="Google Shape;120;gdea865f612_0_48"/>
+          <p:cNvPr id="119" name="Google Shape;119;gdea865f612_0_48"/>
           <p:cNvCxnSpPr>
-            <a:stCxn id="109" idx="1"/>
-            <a:endCxn id="112" idx="3"/>
+            <a:stCxn id="108" idx="1"/>
+            <a:endCxn id="111" idx="3"/>
           </p:cNvCxnSpPr>
           <p:nvPr/>
         </p:nvCxnSpPr>
@@ -17393,10 +17319,10 @@
       </p:cxnSp>
       <p:cxnSp>
         <p:nvCxnSpPr>
-          <p:cNvPr id="121" name="Google Shape;121;gdea865f612_0_48"/>
+          <p:cNvPr id="120" name="Google Shape;120;gdea865f612_0_48"/>
           <p:cNvCxnSpPr>
-            <a:stCxn id="103" idx="1"/>
-            <a:endCxn id="105" idx="3"/>
+            <a:stCxn id="102" idx="1"/>
+            <a:endCxn id="104" idx="3"/>
           </p:cNvCxnSpPr>
           <p:nvPr/>
         </p:nvCxnSpPr>
@@ -17422,7 +17348,7 @@
       </p:cxnSp>
       <p:cxnSp>
         <p:nvCxnSpPr>
-          <p:cNvPr id="122" name="Google Shape;122;gdea865f612_0_48"/>
+          <p:cNvPr id="121" name="Google Shape;121;gdea865f612_0_48"/>
           <p:cNvCxnSpPr/>
           <p:nvPr/>
         </p:nvCxnSpPr>
@@ -17450,7 +17376,7 @@
       </p:cxnSp>
       <p:cxnSp>
         <p:nvCxnSpPr>
-          <p:cNvPr id="123" name="Google Shape;123;gdea865f612_0_48"/>
+          <p:cNvPr id="122" name="Google Shape;122;gdea865f612_0_48"/>
           <p:cNvCxnSpPr/>
           <p:nvPr/>
         </p:nvCxnSpPr>
@@ -17476,7 +17402,7 @@
       </p:cxnSp>
       <p:sp>
         <p:nvSpPr>
-          <p:cNvPr id="124" name="Google Shape;124;gdea865f612_0_48"/>
+          <p:cNvPr id="123" name="Google Shape;123;gdea865f612_0_48"/>
           <p:cNvSpPr/>
           <p:nvPr/>
         </p:nvSpPr>
@@ -17546,7 +17472,7 @@
       </p:sp>
       <p:cxnSp>
         <p:nvCxnSpPr>
-          <p:cNvPr id="125" name="Google Shape;125;gdea865f612_0_48"/>
+          <p:cNvPr id="124" name="Google Shape;124;gdea865f612_0_48"/>
           <p:cNvCxnSpPr/>
           <p:nvPr/>
         </p:nvCxnSpPr>
@@ -17574,7 +17500,7 @@
       </p:cxnSp>
       <p:sp>
         <p:nvSpPr>
-          <p:cNvPr id="126" name="Google Shape;126;gdea865f612_0_48"/>
+          <p:cNvPr id="125" name="Google Shape;125;gdea865f612_0_48"/>
           <p:cNvSpPr/>
           <p:nvPr/>
         </p:nvSpPr>
@@ -17652,7 +17578,7 @@
       </p:sp>
       <p:sp>
         <p:nvSpPr>
-          <p:cNvPr id="127" name="Google Shape;127;gdea865f612_0_48"/>
+          <p:cNvPr id="126" name="Google Shape;126;gdea865f612_0_48"/>
           <p:cNvSpPr/>
           <p:nvPr/>
         </p:nvSpPr>
@@ -17739,7 +17665,7 @@
       </p:sp>
       <p:cxnSp>
         <p:nvCxnSpPr>
-          <p:cNvPr id="128" name="Google Shape;128;gdea865f612_0_48"/>
+          <p:cNvPr id="127" name="Google Shape;127;gdea865f612_0_48"/>
           <p:cNvCxnSpPr/>
           <p:nvPr/>
         </p:nvCxnSpPr>
@@ -17767,9 +17693,9 @@
       </p:cxnSp>
       <p:cxnSp>
         <p:nvCxnSpPr>
-          <p:cNvPr id="129" name="Google Shape;129;gdea865f612_0_48"/>
+          <p:cNvPr id="128" name="Google Shape;128;gdea865f612_0_48"/>
           <p:cNvCxnSpPr>
-            <a:stCxn id="110" idx="1"/>
+            <a:stCxn id="109" idx="1"/>
           </p:cNvCxnSpPr>
           <p:nvPr/>
         </p:nvCxnSpPr>
@@ -17795,7 +17721,7 @@
       </p:cxnSp>
       <p:cxnSp>
         <p:nvCxnSpPr>
-          <p:cNvPr id="130" name="Google Shape;130;gdea865f612_0_48"/>
+          <p:cNvPr id="129" name="Google Shape;129;gdea865f612_0_48"/>
           <p:cNvCxnSpPr/>
           <p:nvPr/>
         </p:nvCxnSpPr>
@@ -17823,9 +17749,9 @@
       </p:cxnSp>
       <p:cxnSp>
         <p:nvCxnSpPr>
-          <p:cNvPr id="131" name="Google Shape;131;gdea865f612_0_48"/>
+          <p:cNvPr id="130" name="Google Shape;130;gdea865f612_0_48"/>
           <p:cNvCxnSpPr>
-            <a:endCxn id="126" idx="1"/>
+            <a:endCxn id="125" idx="1"/>
           </p:cNvCxnSpPr>
           <p:nvPr/>
         </p:nvCxnSpPr>
@@ -17853,10 +17779,8 @@
       </p:cxnSp>
       <p:cxnSp>
         <p:nvCxnSpPr>
-          <p:cNvPr id="132" name="Google Shape;132;gdea865f612_0_48"/>
-          <p:cNvCxnSpPr>
-            <a:endCxn id="99" idx="2"/>
-          </p:cNvCxnSpPr>
+          <p:cNvPr id="131" name="Google Shape;131;gdea865f612_0_48"/>
+          <p:cNvCxnSpPr/>
           <p:nvPr/>
         </p:nvCxnSpPr>
         <p:spPr>
@@ -17864,8 +17788,10 @@
             <a:off x="5628692" y="3082383"/>
             <a:ext cx="4927800" cy="1916400"/>
           </a:xfrm>
-          <a:prstGeom prst="bentConnector2">
-            <a:avLst/>
+          <a:prstGeom prst="bentConnector3">
+            <a:avLst>
+              <a:gd fmla="val 99789" name="adj1"/>
+            </a:avLst>
           </a:prstGeom>
           <a:noFill/>
           <a:ln cap="flat" cmpd="sng" w="19050">
@@ -17881,9 +17807,9 @@
       </p:cxnSp>
       <p:cxnSp>
         <p:nvCxnSpPr>
-          <p:cNvPr id="133" name="Google Shape;133;gdea865f612_0_48"/>
+          <p:cNvPr id="132" name="Google Shape;132;gdea865f612_0_48"/>
           <p:cNvCxnSpPr>
-            <a:endCxn id="111" idx="0"/>
+            <a:endCxn id="110" idx="0"/>
           </p:cNvCxnSpPr>
           <p:nvPr/>
         </p:nvCxnSpPr>
@@ -17911,7 +17837,7 @@
       </p:cxnSp>
       <p:cxnSp>
         <p:nvCxnSpPr>
-          <p:cNvPr id="134" name="Google Shape;134;gdea865f612_0_48"/>
+          <p:cNvPr id="133" name="Google Shape;133;gdea865f612_0_48"/>
           <p:cNvCxnSpPr/>
           <p:nvPr/>
         </p:nvCxnSpPr>
@@ -17939,7 +17865,7 @@
       </p:cxnSp>
       <p:sp>
         <p:nvSpPr>
-          <p:cNvPr id="135" name="Google Shape;135;gdea865f612_0_48"/>
+          <p:cNvPr id="134" name="Google Shape;134;gdea865f612_0_48"/>
           <p:cNvSpPr/>
           <p:nvPr/>
         </p:nvSpPr>
@@ -18035,7 +17961,7 @@
       </p:sp>
       <p:cxnSp>
         <p:nvCxnSpPr>
-          <p:cNvPr id="136" name="Google Shape;136;gdea865f612_0_48"/>
+          <p:cNvPr id="135" name="Google Shape;135;gdea865f612_0_48"/>
           <p:cNvCxnSpPr/>
           <p:nvPr/>
         </p:nvCxnSpPr>
@@ -18063,7 +17989,7 @@
       </p:cxnSp>
       <p:sp>
         <p:nvSpPr>
-          <p:cNvPr id="137" name="Google Shape;137;gdea865f612_0_48"/>
+          <p:cNvPr id="136" name="Google Shape;136;gdea865f612_0_48"/>
           <p:cNvSpPr/>
           <p:nvPr/>
         </p:nvSpPr>
@@ -18141,7 +18067,7 @@
       </p:sp>
       <p:sp>
         <p:nvSpPr>
-          <p:cNvPr id="138" name="Google Shape;138;gdea865f612_0_48"/>
+          <p:cNvPr id="137" name="Google Shape;137;gdea865f612_0_48"/>
           <p:cNvSpPr/>
           <p:nvPr/>
         </p:nvSpPr>
@@ -18228,7 +18154,7 @@
       </p:sp>
       <p:sp>
         <p:nvSpPr>
-          <p:cNvPr id="139" name="Google Shape;139;gdea865f612_0_48"/>
+          <p:cNvPr id="138" name="Google Shape;138;gdea865f612_0_48"/>
           <p:cNvSpPr/>
           <p:nvPr/>
         </p:nvSpPr>
@@ -18306,7 +18232,7 @@
       </p:sp>
       <p:sp>
         <p:nvSpPr>
-          <p:cNvPr id="140" name="Google Shape;140;gdea865f612_0_48"/>
+          <p:cNvPr id="139" name="Google Shape;139;gdea865f612_0_48"/>
           <p:cNvSpPr/>
           <p:nvPr/>
         </p:nvSpPr>
@@ -18389,10 +18315,10 @@
       </p:sp>
       <p:cxnSp>
         <p:nvCxnSpPr>
-          <p:cNvPr id="141" name="Google Shape;141;gdea865f612_0_48"/>
+          <p:cNvPr id="140" name="Google Shape;140;gdea865f612_0_48"/>
           <p:cNvCxnSpPr>
-            <a:stCxn id="135" idx="3"/>
-            <a:endCxn id="139" idx="1"/>
+            <a:stCxn id="134" idx="3"/>
+            <a:endCxn id="138" idx="1"/>
           </p:cNvCxnSpPr>
           <p:nvPr/>
         </p:nvCxnSpPr>
@@ -18420,7 +18346,7 @@
       </p:cxnSp>
       <p:sp>
         <p:nvSpPr>
-          <p:cNvPr id="142" name="Google Shape;142;gdea865f612_0_48"/>
+          <p:cNvPr id="141" name="Google Shape;141;gdea865f612_0_48"/>
           <p:cNvSpPr/>
           <p:nvPr/>
         </p:nvSpPr>
@@ -18507,7 +18433,7 @@
       </p:sp>
       <p:sp>
         <p:nvSpPr>
-          <p:cNvPr id="143" name="Google Shape;143;gdea865f612_0_48"/>
+          <p:cNvPr id="142" name="Google Shape;142;gdea865f612_0_48"/>
           <p:cNvSpPr/>
           <p:nvPr/>
         </p:nvSpPr>
@@ -18596,6 +18522,80 @@
             <a:endParaRPr b="0" i="0" sz="1600" u="none" cap="none" strike="noStrike">
               <a:solidFill>
                 <a:srgbClr val="000000"/>
+              </a:solidFill>
+              <a:latin typeface="Arial"/>
+              <a:ea typeface="Arial"/>
+              <a:cs typeface="Arial"/>
+              <a:sym typeface="Arial"/>
+            </a:endParaRPr>
+          </a:p>
+        </p:txBody>
+      </p:sp>
+      <p:sp>
+        <p:nvSpPr>
+          <p:cNvPr id="143" name="Google Shape;143;gdea865f612_0_48"/>
+          <p:cNvSpPr/>
+          <p:nvPr/>
+        </p:nvSpPr>
+        <p:spPr>
+          <a:xfrm>
+            <a:off x="3638192" y="2612283"/>
+            <a:ext cx="3676200" cy="470100"/>
+          </a:xfrm>
+          <a:prstGeom prst="rect">
+            <a:avLst/>
+          </a:prstGeom>
+          <a:solidFill>
+            <a:schemeClr val="accent1"/>
+          </a:solidFill>
+          <a:ln cap="flat" cmpd="sng" w="12700">
+            <a:solidFill>
+              <a:srgbClr val="31538F"/>
+            </a:solidFill>
+            <a:prstDash val="solid"/>
+            <a:miter lim="800000"/>
+            <a:headEnd len="sm" w="sm" type="none"/>
+            <a:tailEnd len="sm" w="sm" type="none"/>
+          </a:ln>
+        </p:spPr>
+        <p:txBody>
+          <a:bodyPr anchorCtr="0" anchor="ctr" bIns="45700" lIns="91425" spcFirstLastPara="1" rIns="91425" wrap="square" tIns="45700">
+            <a:noAutofit/>
+          </a:bodyPr>
+          <a:lstStyle/>
+          <a:p>
+            <a:pPr indent="0" lvl="0" marL="0" marR="0" rtl="0" algn="ctr">
+              <a:lnSpc>
+                <a:spcPct val="100000"/>
+              </a:lnSpc>
+              <a:spcBef>
+                <a:spcPts val="0"/>
+              </a:spcBef>
+              <a:spcAft>
+                <a:spcPts val="0"/>
+              </a:spcAft>
+              <a:buClr>
+                <a:srgbClr val="000000"/>
+              </a:buClr>
+              <a:buSzPts val="2400"/>
+              <a:buFont typeface="Arial"/>
+              <a:buNone/>
+            </a:pPr>
+            <a:r>
+              <a:rPr b="1" i="0" lang="en-US" sz="2400" u="none" cap="none" strike="noStrike">
+                <a:solidFill>
+                  <a:schemeClr val="lt1"/>
+                </a:solidFill>
+                <a:latin typeface="Arial"/>
+                <a:ea typeface="Arial"/>
+                <a:cs typeface="Arial"/>
+                <a:sym typeface="Arial"/>
+              </a:rPr>
+              <a:t>Admission Controller</a:t>
+            </a:r>
+            <a:endParaRPr b="1" i="0" sz="1400" u="none" cap="none" strike="noStrike">
+              <a:solidFill>
+                <a:schemeClr val="lt1"/>
               </a:solidFill>
               <a:latin typeface="Arial"/>
               <a:ea typeface="Arial"/>

</xml_diff>